<commit_message>
gpp examen ingedient, rasterizer hardware werkt, combustion effect added in software rasterizer
</commit_message>
<xml_diff>
--- a/sem_3/Gameplay_Prog/GPP_Exam/GPP_ZombieAI_WiemeJarne_2DAE15.pptx
+++ b/sem_3/Gameplay_Prog/GPP_Exam/GPP_ZombieAI_WiemeJarne_2DAE15.pptx
@@ -264,7 +264,7 @@
           <a:p>
             <a:fld id="{8BC3728D-6255-4BA0-AD70-1E449D1E9A5B}" type="datetimeFigureOut">
               <a:rPr lang="en-US" smtClean="0"/>
-              <a:t>1/8/2023</a:t>
+              <a:t>1/12/2023</a:t>
             </a:fld>
             <a:endParaRPr lang="en-US"/>
           </a:p>
@@ -764,7 +764,7 @@
           <a:p>
             <a:fld id="{82085877-2B37-48E7-8B6D-4D4ED486130A}" type="datetimeFigureOut">
               <a:rPr lang="en-BE" smtClean="0"/>
-              <a:t>08/01/23</a:t>
+              <a:t>12/01/23</a:t>
             </a:fld>
             <a:endParaRPr lang="en-BE"/>
           </a:p>
@@ -964,7 +964,7 @@
           <a:p>
             <a:fld id="{82085877-2B37-48E7-8B6D-4D4ED486130A}" type="datetimeFigureOut">
               <a:rPr lang="en-BE" smtClean="0"/>
-              <a:t>08/01/23</a:t>
+              <a:t>12/01/23</a:t>
             </a:fld>
             <a:endParaRPr lang="en-BE"/>
           </a:p>
@@ -1174,7 +1174,7 @@
           <a:p>
             <a:fld id="{82085877-2B37-48E7-8B6D-4D4ED486130A}" type="datetimeFigureOut">
               <a:rPr lang="en-BE" smtClean="0"/>
-              <a:t>08/01/23</a:t>
+              <a:t>12/01/23</a:t>
             </a:fld>
             <a:endParaRPr lang="en-BE"/>
           </a:p>
@@ -1374,7 +1374,7 @@
           <a:p>
             <a:fld id="{82085877-2B37-48E7-8B6D-4D4ED486130A}" type="datetimeFigureOut">
               <a:rPr lang="en-BE" smtClean="0"/>
-              <a:t>08/01/23</a:t>
+              <a:t>12/01/23</a:t>
             </a:fld>
             <a:endParaRPr lang="en-BE"/>
           </a:p>
@@ -1650,7 +1650,7 @@
           <a:p>
             <a:fld id="{82085877-2B37-48E7-8B6D-4D4ED486130A}" type="datetimeFigureOut">
               <a:rPr lang="en-BE" smtClean="0"/>
-              <a:t>08/01/23</a:t>
+              <a:t>12/01/23</a:t>
             </a:fld>
             <a:endParaRPr lang="en-BE"/>
           </a:p>
@@ -1918,7 +1918,7 @@
           <a:p>
             <a:fld id="{82085877-2B37-48E7-8B6D-4D4ED486130A}" type="datetimeFigureOut">
               <a:rPr lang="en-BE" smtClean="0"/>
-              <a:t>08/01/23</a:t>
+              <a:t>12/01/23</a:t>
             </a:fld>
             <a:endParaRPr lang="en-BE"/>
           </a:p>
@@ -2333,7 +2333,7 @@
           <a:p>
             <a:fld id="{82085877-2B37-48E7-8B6D-4D4ED486130A}" type="datetimeFigureOut">
               <a:rPr lang="en-BE" smtClean="0"/>
-              <a:t>08/01/23</a:t>
+              <a:t>12/01/23</a:t>
             </a:fld>
             <a:endParaRPr lang="en-BE"/>
           </a:p>
@@ -2475,7 +2475,7 @@
           <a:p>
             <a:fld id="{82085877-2B37-48E7-8B6D-4D4ED486130A}" type="datetimeFigureOut">
               <a:rPr lang="en-BE" smtClean="0"/>
-              <a:t>08/01/23</a:t>
+              <a:t>12/01/23</a:t>
             </a:fld>
             <a:endParaRPr lang="en-BE"/>
           </a:p>
@@ -2588,7 +2588,7 @@
           <a:p>
             <a:fld id="{82085877-2B37-48E7-8B6D-4D4ED486130A}" type="datetimeFigureOut">
               <a:rPr lang="en-BE" smtClean="0"/>
-              <a:t>08/01/23</a:t>
+              <a:t>12/01/23</a:t>
             </a:fld>
             <a:endParaRPr lang="en-BE"/>
           </a:p>
@@ -2901,7 +2901,7 @@
           <a:p>
             <a:fld id="{82085877-2B37-48E7-8B6D-4D4ED486130A}" type="datetimeFigureOut">
               <a:rPr lang="en-BE" smtClean="0"/>
-              <a:t>08/01/23</a:t>
+              <a:t>12/01/23</a:t>
             </a:fld>
             <a:endParaRPr lang="en-BE"/>
           </a:p>
@@ -3190,7 +3190,7 @@
           <a:p>
             <a:fld id="{82085877-2B37-48E7-8B6D-4D4ED486130A}" type="datetimeFigureOut">
               <a:rPr lang="en-BE" smtClean="0"/>
-              <a:t>08/01/23</a:t>
+              <a:t>12/01/23</a:t>
             </a:fld>
             <a:endParaRPr lang="en-BE"/>
           </a:p>
@@ -3433,7 +3433,7 @@
           <a:p>
             <a:fld id="{82085877-2B37-48E7-8B6D-4D4ED486130A}" type="datetimeFigureOut">
               <a:rPr lang="en-BE" smtClean="0"/>
-              <a:t>08/01/23</a:t>
+              <a:t>12/01/23</a:t>
             </a:fld>
             <a:endParaRPr lang="en-BE"/>
           </a:p>
@@ -4554,6 +4554,215 @@
           </a:p>
         </p:txBody>
       </p:sp>
+      <p:pic>
+        <p:nvPicPr>
+          <p:cNvPr id="7" name="Picture 6">
+            <a:extLst>
+              <a:ext uri="{FF2B5EF4-FFF2-40B4-BE49-F238E27FC236}">
+                <a16:creationId xmlns:a16="http://schemas.microsoft.com/office/drawing/2014/main" id="{692F7240-5CEE-96DE-C8A8-C14DFDB2E72E}"/>
+              </a:ext>
+            </a:extLst>
+          </p:cNvPr>
+          <p:cNvPicPr>
+            <a:picLocks noChangeAspect="1"/>
+          </p:cNvPicPr>
+          <p:nvPr/>
+        </p:nvPicPr>
+        <p:blipFill>
+          <a:blip r:embed="rId2"/>
+          <a:stretch>
+            <a:fillRect/>
+          </a:stretch>
+        </p:blipFill>
+        <p:spPr>
+          <a:xfrm>
+            <a:off x="735729" y="1482102"/>
+            <a:ext cx="1800476" cy="1505160"/>
+          </a:xfrm>
+          <a:prstGeom prst="rect">
+            <a:avLst/>
+          </a:prstGeom>
+        </p:spPr>
+      </p:pic>
+      <p:pic>
+        <p:nvPicPr>
+          <p:cNvPr id="9" name="Picture 8">
+            <a:extLst>
+              <a:ext uri="{FF2B5EF4-FFF2-40B4-BE49-F238E27FC236}">
+                <a16:creationId xmlns:a16="http://schemas.microsoft.com/office/drawing/2014/main" id="{560EB45C-AA94-7907-58F4-550FEA59076C}"/>
+              </a:ext>
+            </a:extLst>
+          </p:cNvPr>
+          <p:cNvPicPr>
+            <a:picLocks noChangeAspect="1"/>
+          </p:cNvPicPr>
+          <p:nvPr/>
+        </p:nvPicPr>
+        <p:blipFill>
+          <a:blip r:embed="rId3"/>
+          <a:stretch>
+            <a:fillRect/>
+          </a:stretch>
+        </p:blipFill>
+        <p:spPr>
+          <a:xfrm>
+            <a:off x="2816651" y="1482102"/>
+            <a:ext cx="1781424" cy="1514686"/>
+          </a:xfrm>
+          <a:prstGeom prst="rect">
+            <a:avLst/>
+          </a:prstGeom>
+        </p:spPr>
+      </p:pic>
+      <p:pic>
+        <p:nvPicPr>
+          <p:cNvPr id="11" name="Picture 10">
+            <a:extLst>
+              <a:ext uri="{FF2B5EF4-FFF2-40B4-BE49-F238E27FC236}">
+                <a16:creationId xmlns:a16="http://schemas.microsoft.com/office/drawing/2014/main" id="{0451B017-1DAD-E11A-6047-36B4CA9AF41A}"/>
+              </a:ext>
+            </a:extLst>
+          </p:cNvPr>
+          <p:cNvPicPr>
+            <a:picLocks noChangeAspect="1"/>
+          </p:cNvPicPr>
+          <p:nvPr/>
+        </p:nvPicPr>
+        <p:blipFill rotWithShape="1">
+          <a:blip r:embed="rId4"/>
+          <a:srcRect l="5077" t="3889" r="2538" b="11666"/>
+          <a:stretch/>
+        </p:blipFill>
+        <p:spPr>
+          <a:xfrm>
+            <a:off x="4805336" y="1548785"/>
+            <a:ext cx="1733792" cy="1448003"/>
+          </a:xfrm>
+          <a:prstGeom prst="rect">
+            <a:avLst/>
+          </a:prstGeom>
+        </p:spPr>
+      </p:pic>
+      <p:pic>
+        <p:nvPicPr>
+          <p:cNvPr id="13" name="Picture 12">
+            <a:extLst>
+              <a:ext uri="{FF2B5EF4-FFF2-40B4-BE49-F238E27FC236}">
+                <a16:creationId xmlns:a16="http://schemas.microsoft.com/office/drawing/2014/main" id="{7CCFB43C-3829-0BDA-093A-5AB381E802F1}"/>
+              </a:ext>
+            </a:extLst>
+          </p:cNvPr>
+          <p:cNvPicPr>
+            <a:picLocks noChangeAspect="1"/>
+          </p:cNvPicPr>
+          <p:nvPr/>
+        </p:nvPicPr>
+        <p:blipFill>
+          <a:blip r:embed="rId5"/>
+          <a:stretch>
+            <a:fillRect/>
+          </a:stretch>
+        </p:blipFill>
+        <p:spPr>
+          <a:xfrm>
+            <a:off x="6679704" y="1548786"/>
+            <a:ext cx="1800476" cy="1448002"/>
+          </a:xfrm>
+          <a:prstGeom prst="rect">
+            <a:avLst/>
+          </a:prstGeom>
+        </p:spPr>
+      </p:pic>
+      <p:pic>
+        <p:nvPicPr>
+          <p:cNvPr id="15" name="Picture 14">
+            <a:extLst>
+              <a:ext uri="{FF2B5EF4-FFF2-40B4-BE49-F238E27FC236}">
+                <a16:creationId xmlns:a16="http://schemas.microsoft.com/office/drawing/2014/main" id="{58D81429-AE26-DB8B-20FE-A107F1CECF4A}"/>
+              </a:ext>
+            </a:extLst>
+          </p:cNvPr>
+          <p:cNvPicPr>
+            <a:picLocks noChangeAspect="1"/>
+          </p:cNvPicPr>
+          <p:nvPr/>
+        </p:nvPicPr>
+        <p:blipFill>
+          <a:blip r:embed="rId6"/>
+          <a:stretch>
+            <a:fillRect/>
+          </a:stretch>
+        </p:blipFill>
+        <p:spPr>
+          <a:xfrm>
+            <a:off x="8804348" y="1548786"/>
+            <a:ext cx="1733792" cy="1448002"/>
+          </a:xfrm>
+          <a:prstGeom prst="rect">
+            <a:avLst/>
+          </a:prstGeom>
+        </p:spPr>
+      </p:pic>
+      <p:pic>
+        <p:nvPicPr>
+          <p:cNvPr id="17" name="Picture 16">
+            <a:extLst>
+              <a:ext uri="{FF2B5EF4-FFF2-40B4-BE49-F238E27FC236}">
+                <a16:creationId xmlns:a16="http://schemas.microsoft.com/office/drawing/2014/main" id="{1FEDB3D9-0FF6-163C-42B5-905408A51634}"/>
+              </a:ext>
+            </a:extLst>
+          </p:cNvPr>
+          <p:cNvPicPr>
+            <a:picLocks noChangeAspect="1"/>
+          </p:cNvPicPr>
+          <p:nvPr/>
+        </p:nvPicPr>
+        <p:blipFill>
+          <a:blip r:embed="rId7"/>
+          <a:stretch>
+            <a:fillRect/>
+          </a:stretch>
+        </p:blipFill>
+        <p:spPr>
+          <a:xfrm>
+            <a:off x="726202" y="3196841"/>
+            <a:ext cx="1819529" cy="1514686"/>
+          </a:xfrm>
+          <a:prstGeom prst="rect">
+            <a:avLst/>
+          </a:prstGeom>
+        </p:spPr>
+      </p:pic>
+      <p:pic>
+        <p:nvPicPr>
+          <p:cNvPr id="19" name="Picture 18">
+            <a:extLst>
+              <a:ext uri="{FF2B5EF4-FFF2-40B4-BE49-F238E27FC236}">
+                <a16:creationId xmlns:a16="http://schemas.microsoft.com/office/drawing/2014/main" id="{AC27F04E-7E5A-8DE8-F0C6-3A7961A71271}"/>
+              </a:ext>
+            </a:extLst>
+          </p:cNvPr>
+          <p:cNvPicPr>
+            <a:picLocks noChangeAspect="1"/>
+          </p:cNvPicPr>
+          <p:nvPr/>
+        </p:nvPicPr>
+        <p:blipFill>
+          <a:blip r:embed="rId8"/>
+          <a:stretch>
+            <a:fillRect/>
+          </a:stretch>
+        </p:blipFill>
+        <p:spPr>
+          <a:xfrm>
+            <a:off x="2788072" y="3248714"/>
+            <a:ext cx="1810003" cy="1505160"/>
+          </a:xfrm>
+          <a:prstGeom prst="rect">
+            <a:avLst/>
+          </a:prstGeom>
+        </p:spPr>
+      </p:pic>
     </p:spTree>
     <p:extLst>
       <p:ext uri="{BB962C8B-B14F-4D97-AF65-F5344CB8AC3E}">
@@ -5158,6 +5367,21 @@
 </file>
 
 <file path=customXml/item1.xml><?xml version="1.0" encoding="utf-8"?>
+<p:properties xmlns:p="http://schemas.microsoft.com/office/2006/metadata/properties" xmlns:xsi="http://www.w3.org/2001/XMLSchema-instance" xmlns:pc="http://schemas.microsoft.com/office/infopath/2007/PartnerControls">
+  <documentManagement>
+    <IconOverlay xmlns="http://schemas.microsoft.com/sharepoint/v4" xsi:nil="true"/>
+    <TaxCatchAll xmlns="128482ec-0431-40d5-ab26-89ea2a4f3ccd" xsi:nil="true"/>
+    <m99485b88215436a82099f8287cba0b0 xmlns="128482ec-0431-40d5-ab26-89ea2a4f3ccd">
+      <Terms xmlns="http://schemas.microsoft.com/office/infopath/2007/PartnerControls"/>
+    </m99485b88215436a82099f8287cba0b0>
+    <lcf76f155ced4ddcb4097134ff3c332f xmlns="60eb0cf4-ae2a-4762-800a-cb593b869ecb">
+      <Terms xmlns="http://schemas.microsoft.com/office/infopath/2007/PartnerControls"/>
+    </lcf76f155ced4ddcb4097134ff3c332f>
+  </documentManagement>
+</p:properties>
+</file>
+
+<file path=customXml/item2.xml><?xml version="1.0" encoding="utf-8"?>
 <ct:contentTypeSchema xmlns:ct="http://schemas.microsoft.com/office/2006/metadata/contentType" xmlns:ma="http://schemas.microsoft.com/office/2006/metadata/properties/metaAttributes" ct:_="" ma:_="" ma:contentTypeName="Document" ma:contentTypeID="0x010100723942CCEB3A674D8F1F6472CCEFB38E" ma:contentTypeVersion="10" ma:contentTypeDescription="Create a new document." ma:contentTypeScope="" ma:versionID="16a01ce9272d529e040be000891ba687">
   <xsd:schema xmlns:xsd="http://www.w3.org/2001/XMLSchema" xmlns:xs="http://www.w3.org/2001/XMLSchema" xmlns:p="http://schemas.microsoft.com/office/2006/metadata/properties" xmlns:ns2="128482ec-0431-40d5-ab26-89ea2a4f3ccd" xmlns:ns3="60eb0cf4-ae2a-4762-800a-cb593b869ecb" xmlns:ns4="http://schemas.microsoft.com/sharepoint/v4" xmlns:ns5="a2e691a9-fcfc-4d85-a390-1894fe98bd9e" targetNamespace="http://schemas.microsoft.com/office/2006/metadata/properties" ma:root="true" ma:fieldsID="f316950213048d470c4fd696bb5ac3d5" ns2:_="" ns3:_="" ns4:_="" ns5:_="">
     <xsd:import namespace="128482ec-0431-40d5-ab26-89ea2a4f3ccd"/>
@@ -5424,21 +5648,6 @@
 </ct:contentTypeSchema>
 </file>
 
-<file path=customXml/item2.xml><?xml version="1.0" encoding="utf-8"?>
-<p:properties xmlns:p="http://schemas.microsoft.com/office/2006/metadata/properties" xmlns:xsi="http://www.w3.org/2001/XMLSchema-instance" xmlns:pc="http://schemas.microsoft.com/office/infopath/2007/PartnerControls">
-  <documentManagement>
-    <IconOverlay xmlns="http://schemas.microsoft.com/sharepoint/v4" xsi:nil="true"/>
-    <TaxCatchAll xmlns="128482ec-0431-40d5-ab26-89ea2a4f3ccd" xsi:nil="true"/>
-    <m99485b88215436a82099f8287cba0b0 xmlns="128482ec-0431-40d5-ab26-89ea2a4f3ccd">
-      <Terms xmlns="http://schemas.microsoft.com/office/infopath/2007/PartnerControls"/>
-    </m99485b88215436a82099f8287cba0b0>
-    <lcf76f155ced4ddcb4097134ff3c332f xmlns="60eb0cf4-ae2a-4762-800a-cb593b869ecb">
-      <Terms xmlns="http://schemas.microsoft.com/office/infopath/2007/PartnerControls"/>
-    </lcf76f155ced4ddcb4097134ff3c332f>
-  </documentManagement>
-</p:properties>
-</file>
-
 <file path=customXml/item3.xml><?xml version="1.0" encoding="utf-8"?>
 <?mso-contentType ?>
 <FormTemplates xmlns="http://schemas.microsoft.com/sharepoint/v3/contenttype/forms">
@@ -5449,6 +5658,18 @@
 </file>
 
 <file path=customXml/itemProps1.xml><?xml version="1.0" encoding="utf-8"?>
+<ds:datastoreItem xmlns:ds="http://schemas.openxmlformats.org/officeDocument/2006/customXml" ds:itemID="{B743389A-7EE0-4951-8919-E91DD69E3687}">
+  <ds:schemaRefs>
+    <ds:schemaRef ds:uri="128482ec-0431-40d5-ab26-89ea2a4f3ccd"/>
+    <ds:schemaRef ds:uri="http://schemas.microsoft.com/office/2006/metadata/properties"/>
+    <ds:schemaRef ds:uri="http://schemas.microsoft.com/office/infopath/2007/PartnerControls"/>
+    <ds:schemaRef ds:uri="http://schemas.microsoft.com/sharepoint/v4"/>
+    <ds:schemaRef ds:uri="60eb0cf4-ae2a-4762-800a-cb593b869ecb"/>
+  </ds:schemaRefs>
+</ds:datastoreItem>
+</file>
+
+<file path=customXml/itemProps2.xml><?xml version="1.0" encoding="utf-8"?>
 <ds:datastoreItem xmlns:ds="http://schemas.openxmlformats.org/officeDocument/2006/customXml" ds:itemID="{CB95CD2F-7AF1-41D4-B9F6-F2104A185175}">
   <ds:schemaRefs>
     <ds:schemaRef ds:uri="http://schemas.microsoft.com/office/2006/metadata/contentType"/>
@@ -5469,18 +5690,6 @@
 </ds:datastoreItem>
 </file>
 
-<file path=customXml/itemProps2.xml><?xml version="1.0" encoding="utf-8"?>
-<ds:datastoreItem xmlns:ds="http://schemas.openxmlformats.org/officeDocument/2006/customXml" ds:itemID="{B743389A-7EE0-4951-8919-E91DD69E3687}">
-  <ds:schemaRefs>
-    <ds:schemaRef ds:uri="128482ec-0431-40d5-ab26-89ea2a4f3ccd"/>
-    <ds:schemaRef ds:uri="http://schemas.microsoft.com/office/2006/metadata/properties"/>
-    <ds:schemaRef ds:uri="http://schemas.microsoft.com/office/infopath/2007/PartnerControls"/>
-    <ds:schemaRef ds:uri="http://schemas.microsoft.com/sharepoint/v4"/>
-    <ds:schemaRef ds:uri="60eb0cf4-ae2a-4762-800a-cb593b869ecb"/>
-  </ds:schemaRefs>
-</ds:datastoreItem>
-</file>
-
 <file path=customXml/itemProps3.xml><?xml version="1.0" encoding="utf-8"?>
 <ds:datastoreItem xmlns:ds="http://schemas.openxmlformats.org/officeDocument/2006/customXml" ds:itemID="{AF8EC6D1-CB19-4400-AD0A-0C75CD884AEA}">
   <ds:schemaRefs>

</xml_diff>